<commit_message>
Experimental setup Bild geändert
</commit_message>
<xml_diff>
--- a/images/experimentalsetup.pptx
+++ b/images/experimentalsetup.pptx
@@ -104,6 +104,22 @@
       </a:defRPr>
     </a:lvl9pPr>
   </p:defaultTextStyle>
+  <p:extLst>
+    <p:ext uri="{EFAFB233-063F-42B5-8137-9DF3F51BA10A}">
+      <p15:sldGuideLst xmlns:p15="http://schemas.microsoft.com/office/powerpoint/2012/main">
+        <p15:guide id="1" orient="horz" pos="1610">
+          <p15:clr>
+            <a:srgbClr val="A4A3A4"/>
+          </p15:clr>
+        </p15:guide>
+        <p15:guide id="2" pos="2552">
+          <p15:clr>
+            <a:srgbClr val="A4A3A4"/>
+          </p15:clr>
+        </p15:guide>
+      </p15:sldGuideLst>
+    </p:ext>
+  </p:extLst>
 </p:presentation>
 </file>
 
@@ -145,10 +161,9 @@
           <a:lstStyle/>
           <a:p>
             <a:r>
-              <a:rPr lang="de-DE" smtClean="0"/>
+              <a:rPr lang="de-DE"/>
               <a:t>Titelmasterformat durch Klicken bearbeiten</a:t>
             </a:r>
-            <a:endParaRPr lang="de-DE"/>
           </a:p>
         </p:txBody>
       </p:sp>
@@ -264,10 +279,9 @@
           </a:lstStyle>
           <a:p>
             <a:r>
-              <a:rPr lang="de-DE" smtClean="0"/>
+              <a:rPr lang="de-DE"/>
               <a:t>Formatvorlage des Untertitelmasters durch Klicken bearbeiten</a:t>
             </a:r>
-            <a:endParaRPr lang="de-DE"/>
           </a:p>
         </p:txBody>
       </p:sp>
@@ -288,7 +302,7 @@
           <a:p>
             <a:fld id="{6CC7980B-B61E-4E35-8F3B-1A4DE9C1591D}" type="datetimeFigureOut">
               <a:rPr lang="de-DE" smtClean="0"/>
-              <a:t>23.06.2020</a:t>
+              <a:t>08.03.2021</a:t>
             </a:fld>
             <a:endParaRPr lang="de-DE"/>
           </a:p>
@@ -382,10 +396,9 @@
           <a:lstStyle/>
           <a:p>
             <a:r>
-              <a:rPr lang="de-DE" smtClean="0"/>
+              <a:rPr lang="de-DE"/>
               <a:t>Titelmasterformat durch Klicken bearbeiten</a:t>
             </a:r>
-            <a:endParaRPr lang="de-DE"/>
           </a:p>
         </p:txBody>
       </p:sp>
@@ -406,38 +419,37 @@
           <a:p>
             <a:pPr lvl="0"/>
             <a:r>
-              <a:rPr lang="de-DE" smtClean="0"/>
+              <a:rPr lang="de-DE"/>
               <a:t>Textmasterformat bearbeiten</a:t>
             </a:r>
           </a:p>
           <a:p>
             <a:pPr lvl="1"/>
             <a:r>
-              <a:rPr lang="de-DE" smtClean="0"/>
+              <a:rPr lang="de-DE"/>
               <a:t>Zweite Ebene</a:t>
             </a:r>
           </a:p>
           <a:p>
             <a:pPr lvl="2"/>
             <a:r>
-              <a:rPr lang="de-DE" smtClean="0"/>
+              <a:rPr lang="de-DE"/>
               <a:t>Dritte Ebene</a:t>
             </a:r>
           </a:p>
           <a:p>
             <a:pPr lvl="3"/>
             <a:r>
-              <a:rPr lang="de-DE" smtClean="0"/>
+              <a:rPr lang="de-DE"/>
               <a:t>Vierte Ebene</a:t>
             </a:r>
           </a:p>
           <a:p>
             <a:pPr lvl="4"/>
             <a:r>
-              <a:rPr lang="de-DE" smtClean="0"/>
+              <a:rPr lang="de-DE"/>
               <a:t>Fünfte Ebene</a:t>
             </a:r>
-            <a:endParaRPr lang="de-DE"/>
           </a:p>
         </p:txBody>
       </p:sp>
@@ -458,7 +470,7 @@
           <a:p>
             <a:fld id="{6CC7980B-B61E-4E35-8F3B-1A4DE9C1591D}" type="datetimeFigureOut">
               <a:rPr lang="de-DE" smtClean="0"/>
-              <a:t>23.06.2020</a:t>
+              <a:t>08.03.2021</a:t>
             </a:fld>
             <a:endParaRPr lang="de-DE"/>
           </a:p>
@@ -557,10 +569,9 @@
           <a:lstStyle/>
           <a:p>
             <a:r>
-              <a:rPr lang="de-DE" smtClean="0"/>
+              <a:rPr lang="de-DE"/>
               <a:t>Titelmasterformat durch Klicken bearbeiten</a:t>
             </a:r>
-            <a:endParaRPr lang="de-DE"/>
           </a:p>
         </p:txBody>
       </p:sp>
@@ -586,38 +597,37 @@
           <a:p>
             <a:pPr lvl="0"/>
             <a:r>
-              <a:rPr lang="de-DE" smtClean="0"/>
+              <a:rPr lang="de-DE"/>
               <a:t>Textmasterformat bearbeiten</a:t>
             </a:r>
           </a:p>
           <a:p>
             <a:pPr lvl="1"/>
             <a:r>
-              <a:rPr lang="de-DE" smtClean="0"/>
+              <a:rPr lang="de-DE"/>
               <a:t>Zweite Ebene</a:t>
             </a:r>
           </a:p>
           <a:p>
             <a:pPr lvl="2"/>
             <a:r>
-              <a:rPr lang="de-DE" smtClean="0"/>
+              <a:rPr lang="de-DE"/>
               <a:t>Dritte Ebene</a:t>
             </a:r>
           </a:p>
           <a:p>
             <a:pPr lvl="3"/>
             <a:r>
-              <a:rPr lang="de-DE" smtClean="0"/>
+              <a:rPr lang="de-DE"/>
               <a:t>Vierte Ebene</a:t>
             </a:r>
           </a:p>
           <a:p>
             <a:pPr lvl="4"/>
             <a:r>
-              <a:rPr lang="de-DE" smtClean="0"/>
+              <a:rPr lang="de-DE"/>
               <a:t>Fünfte Ebene</a:t>
             </a:r>
-            <a:endParaRPr lang="de-DE"/>
           </a:p>
         </p:txBody>
       </p:sp>
@@ -638,7 +648,7 @@
           <a:p>
             <a:fld id="{6CC7980B-B61E-4E35-8F3B-1A4DE9C1591D}" type="datetimeFigureOut">
               <a:rPr lang="de-DE" smtClean="0"/>
-              <a:t>23.06.2020</a:t>
+              <a:t>08.03.2021</a:t>
             </a:fld>
             <a:endParaRPr lang="de-DE"/>
           </a:p>
@@ -732,10 +742,9 @@
           <a:lstStyle/>
           <a:p>
             <a:r>
-              <a:rPr lang="de-DE" smtClean="0"/>
+              <a:rPr lang="de-DE"/>
               <a:t>Titelmasterformat durch Klicken bearbeiten</a:t>
             </a:r>
-            <a:endParaRPr lang="de-DE"/>
           </a:p>
         </p:txBody>
       </p:sp>
@@ -756,38 +765,37 @@
           <a:p>
             <a:pPr lvl="0"/>
             <a:r>
-              <a:rPr lang="de-DE" smtClean="0"/>
+              <a:rPr lang="de-DE"/>
               <a:t>Textmasterformat bearbeiten</a:t>
             </a:r>
           </a:p>
           <a:p>
             <a:pPr lvl="1"/>
             <a:r>
-              <a:rPr lang="de-DE" smtClean="0"/>
+              <a:rPr lang="de-DE"/>
               <a:t>Zweite Ebene</a:t>
             </a:r>
           </a:p>
           <a:p>
             <a:pPr lvl="2"/>
             <a:r>
-              <a:rPr lang="de-DE" smtClean="0"/>
+              <a:rPr lang="de-DE"/>
               <a:t>Dritte Ebene</a:t>
             </a:r>
           </a:p>
           <a:p>
             <a:pPr lvl="3"/>
             <a:r>
-              <a:rPr lang="de-DE" smtClean="0"/>
+              <a:rPr lang="de-DE"/>
               <a:t>Vierte Ebene</a:t>
             </a:r>
           </a:p>
           <a:p>
             <a:pPr lvl="4"/>
             <a:r>
-              <a:rPr lang="de-DE" smtClean="0"/>
+              <a:rPr lang="de-DE"/>
               <a:t>Fünfte Ebene</a:t>
             </a:r>
-            <a:endParaRPr lang="de-DE"/>
           </a:p>
         </p:txBody>
       </p:sp>
@@ -808,7 +816,7 @@
           <a:p>
             <a:fld id="{6CC7980B-B61E-4E35-8F3B-1A4DE9C1591D}" type="datetimeFigureOut">
               <a:rPr lang="de-DE" smtClean="0"/>
-              <a:t>23.06.2020</a:t>
+              <a:t>08.03.2021</a:t>
             </a:fld>
             <a:endParaRPr lang="de-DE"/>
           </a:p>
@@ -911,10 +919,9 @@
           </a:lstStyle>
           <a:p>
             <a:r>
-              <a:rPr lang="de-DE" smtClean="0"/>
+              <a:rPr lang="de-DE"/>
               <a:t>Titelmasterformat durch Klicken bearbeiten</a:t>
             </a:r>
-            <a:endParaRPr lang="de-DE"/>
           </a:p>
         </p:txBody>
       </p:sp>
@@ -1031,7 +1038,7 @@
           <a:p>
             <a:pPr lvl="0"/>
             <a:r>
-              <a:rPr lang="de-DE" smtClean="0"/>
+              <a:rPr lang="de-DE"/>
               <a:t>Textmasterformat bearbeiten</a:t>
             </a:r>
           </a:p>
@@ -1054,7 +1061,7 @@
           <a:p>
             <a:fld id="{6CC7980B-B61E-4E35-8F3B-1A4DE9C1591D}" type="datetimeFigureOut">
               <a:rPr lang="de-DE" smtClean="0"/>
-              <a:t>23.06.2020</a:t>
+              <a:t>08.03.2021</a:t>
             </a:fld>
             <a:endParaRPr lang="de-DE"/>
           </a:p>
@@ -1148,10 +1155,9 @@
           <a:lstStyle/>
           <a:p>
             <a:r>
-              <a:rPr lang="de-DE" smtClean="0"/>
+              <a:rPr lang="de-DE"/>
               <a:t>Titelmasterformat durch Klicken bearbeiten</a:t>
             </a:r>
-            <a:endParaRPr lang="de-DE"/>
           </a:p>
         </p:txBody>
       </p:sp>
@@ -1205,38 +1211,37 @@
           <a:p>
             <a:pPr lvl="0"/>
             <a:r>
-              <a:rPr lang="de-DE" smtClean="0"/>
+              <a:rPr lang="de-DE"/>
               <a:t>Textmasterformat bearbeiten</a:t>
             </a:r>
           </a:p>
           <a:p>
             <a:pPr lvl="1"/>
             <a:r>
-              <a:rPr lang="de-DE" smtClean="0"/>
+              <a:rPr lang="de-DE"/>
               <a:t>Zweite Ebene</a:t>
             </a:r>
           </a:p>
           <a:p>
             <a:pPr lvl="2"/>
             <a:r>
-              <a:rPr lang="de-DE" smtClean="0"/>
+              <a:rPr lang="de-DE"/>
               <a:t>Dritte Ebene</a:t>
             </a:r>
           </a:p>
           <a:p>
             <a:pPr lvl="3"/>
             <a:r>
-              <a:rPr lang="de-DE" smtClean="0"/>
+              <a:rPr lang="de-DE"/>
               <a:t>Vierte Ebene</a:t>
             </a:r>
           </a:p>
           <a:p>
             <a:pPr lvl="4"/>
             <a:r>
-              <a:rPr lang="de-DE" smtClean="0"/>
+              <a:rPr lang="de-DE"/>
               <a:t>Fünfte Ebene</a:t>
             </a:r>
-            <a:endParaRPr lang="de-DE"/>
           </a:p>
         </p:txBody>
       </p:sp>
@@ -1290,38 +1295,37 @@
           <a:p>
             <a:pPr lvl="0"/>
             <a:r>
-              <a:rPr lang="de-DE" smtClean="0"/>
+              <a:rPr lang="de-DE"/>
               <a:t>Textmasterformat bearbeiten</a:t>
             </a:r>
           </a:p>
           <a:p>
             <a:pPr lvl="1"/>
             <a:r>
-              <a:rPr lang="de-DE" smtClean="0"/>
+              <a:rPr lang="de-DE"/>
               <a:t>Zweite Ebene</a:t>
             </a:r>
           </a:p>
           <a:p>
             <a:pPr lvl="2"/>
             <a:r>
-              <a:rPr lang="de-DE" smtClean="0"/>
+              <a:rPr lang="de-DE"/>
               <a:t>Dritte Ebene</a:t>
             </a:r>
           </a:p>
           <a:p>
             <a:pPr lvl="3"/>
             <a:r>
-              <a:rPr lang="de-DE" smtClean="0"/>
+              <a:rPr lang="de-DE"/>
               <a:t>Vierte Ebene</a:t>
             </a:r>
           </a:p>
           <a:p>
             <a:pPr lvl="4"/>
             <a:r>
-              <a:rPr lang="de-DE" smtClean="0"/>
+              <a:rPr lang="de-DE"/>
               <a:t>Fünfte Ebene</a:t>
             </a:r>
-            <a:endParaRPr lang="de-DE"/>
           </a:p>
         </p:txBody>
       </p:sp>
@@ -1342,7 +1346,7 @@
           <a:p>
             <a:fld id="{6CC7980B-B61E-4E35-8F3B-1A4DE9C1591D}" type="datetimeFigureOut">
               <a:rPr lang="de-DE" smtClean="0"/>
-              <a:t>23.06.2020</a:t>
+              <a:t>08.03.2021</a:t>
             </a:fld>
             <a:endParaRPr lang="de-DE"/>
           </a:p>
@@ -1440,10 +1444,9 @@
           </a:lstStyle>
           <a:p>
             <a:r>
-              <a:rPr lang="de-DE" smtClean="0"/>
+              <a:rPr lang="de-DE"/>
               <a:t>Titelmasterformat durch Klicken bearbeiten</a:t>
             </a:r>
-            <a:endParaRPr lang="de-DE"/>
           </a:p>
         </p:txBody>
       </p:sp>
@@ -1506,7 +1509,7 @@
           <a:p>
             <a:pPr lvl="0"/>
             <a:r>
-              <a:rPr lang="de-DE" smtClean="0"/>
+              <a:rPr lang="de-DE"/>
               <a:t>Textmasterformat bearbeiten</a:t>
             </a:r>
           </a:p>
@@ -1562,38 +1565,37 @@
           <a:p>
             <a:pPr lvl="0"/>
             <a:r>
-              <a:rPr lang="de-DE" smtClean="0"/>
+              <a:rPr lang="de-DE"/>
               <a:t>Textmasterformat bearbeiten</a:t>
             </a:r>
           </a:p>
           <a:p>
             <a:pPr lvl="1"/>
             <a:r>
-              <a:rPr lang="de-DE" smtClean="0"/>
+              <a:rPr lang="de-DE"/>
               <a:t>Zweite Ebene</a:t>
             </a:r>
           </a:p>
           <a:p>
             <a:pPr lvl="2"/>
             <a:r>
-              <a:rPr lang="de-DE" smtClean="0"/>
+              <a:rPr lang="de-DE"/>
               <a:t>Dritte Ebene</a:t>
             </a:r>
           </a:p>
           <a:p>
             <a:pPr lvl="3"/>
             <a:r>
-              <a:rPr lang="de-DE" smtClean="0"/>
+              <a:rPr lang="de-DE"/>
               <a:t>Vierte Ebene</a:t>
             </a:r>
           </a:p>
           <a:p>
             <a:pPr lvl="4"/>
             <a:r>
-              <a:rPr lang="de-DE" smtClean="0"/>
+              <a:rPr lang="de-DE"/>
               <a:t>Fünfte Ebene</a:t>
             </a:r>
-            <a:endParaRPr lang="de-DE"/>
           </a:p>
         </p:txBody>
       </p:sp>
@@ -1656,7 +1658,7 @@
           <a:p>
             <a:pPr lvl="0"/>
             <a:r>
-              <a:rPr lang="de-DE" smtClean="0"/>
+              <a:rPr lang="de-DE"/>
               <a:t>Textmasterformat bearbeiten</a:t>
             </a:r>
           </a:p>
@@ -1712,38 +1714,37 @@
           <a:p>
             <a:pPr lvl="0"/>
             <a:r>
-              <a:rPr lang="de-DE" smtClean="0"/>
+              <a:rPr lang="de-DE"/>
               <a:t>Textmasterformat bearbeiten</a:t>
             </a:r>
           </a:p>
           <a:p>
             <a:pPr lvl="1"/>
             <a:r>
-              <a:rPr lang="de-DE" smtClean="0"/>
+              <a:rPr lang="de-DE"/>
               <a:t>Zweite Ebene</a:t>
             </a:r>
           </a:p>
           <a:p>
             <a:pPr lvl="2"/>
             <a:r>
-              <a:rPr lang="de-DE" smtClean="0"/>
+              <a:rPr lang="de-DE"/>
               <a:t>Dritte Ebene</a:t>
             </a:r>
           </a:p>
           <a:p>
             <a:pPr lvl="3"/>
             <a:r>
-              <a:rPr lang="de-DE" smtClean="0"/>
+              <a:rPr lang="de-DE"/>
               <a:t>Vierte Ebene</a:t>
             </a:r>
           </a:p>
           <a:p>
             <a:pPr lvl="4"/>
             <a:r>
-              <a:rPr lang="de-DE" smtClean="0"/>
+              <a:rPr lang="de-DE"/>
               <a:t>Fünfte Ebene</a:t>
             </a:r>
-            <a:endParaRPr lang="de-DE"/>
           </a:p>
         </p:txBody>
       </p:sp>
@@ -1764,7 +1765,7 @@
           <a:p>
             <a:fld id="{6CC7980B-B61E-4E35-8F3B-1A4DE9C1591D}" type="datetimeFigureOut">
               <a:rPr lang="de-DE" smtClean="0"/>
-              <a:t>23.06.2020</a:t>
+              <a:t>08.03.2021</a:t>
             </a:fld>
             <a:endParaRPr lang="de-DE"/>
           </a:p>
@@ -1858,10 +1859,9 @@
           <a:lstStyle/>
           <a:p>
             <a:r>
-              <a:rPr lang="de-DE" smtClean="0"/>
+              <a:rPr lang="de-DE"/>
               <a:t>Titelmasterformat durch Klicken bearbeiten</a:t>
             </a:r>
-            <a:endParaRPr lang="de-DE"/>
           </a:p>
         </p:txBody>
       </p:sp>
@@ -1882,7 +1882,7 @@
           <a:p>
             <a:fld id="{6CC7980B-B61E-4E35-8F3B-1A4DE9C1591D}" type="datetimeFigureOut">
               <a:rPr lang="de-DE" smtClean="0"/>
-              <a:t>23.06.2020</a:t>
+              <a:t>08.03.2021</a:t>
             </a:fld>
             <a:endParaRPr lang="de-DE"/>
           </a:p>
@@ -1977,7 +1977,7 @@
           <a:p>
             <a:fld id="{6CC7980B-B61E-4E35-8F3B-1A4DE9C1591D}" type="datetimeFigureOut">
               <a:rPr lang="de-DE" smtClean="0"/>
-              <a:t>23.06.2020</a:t>
+              <a:t>08.03.2021</a:t>
             </a:fld>
             <a:endParaRPr lang="de-DE"/>
           </a:p>
@@ -2080,10 +2080,9 @@
           </a:lstStyle>
           <a:p>
             <a:r>
-              <a:rPr lang="de-DE" smtClean="0"/>
+              <a:rPr lang="de-DE"/>
               <a:t>Titelmasterformat durch Klicken bearbeiten</a:t>
             </a:r>
-            <a:endParaRPr lang="de-DE"/>
           </a:p>
         </p:txBody>
       </p:sp>
@@ -2137,38 +2136,37 @@
           <a:p>
             <a:pPr lvl="0"/>
             <a:r>
-              <a:rPr lang="de-DE" smtClean="0"/>
+              <a:rPr lang="de-DE"/>
               <a:t>Textmasterformat bearbeiten</a:t>
             </a:r>
           </a:p>
           <a:p>
             <a:pPr lvl="1"/>
             <a:r>
-              <a:rPr lang="de-DE" smtClean="0"/>
+              <a:rPr lang="de-DE"/>
               <a:t>Zweite Ebene</a:t>
             </a:r>
           </a:p>
           <a:p>
             <a:pPr lvl="2"/>
             <a:r>
-              <a:rPr lang="de-DE" smtClean="0"/>
+              <a:rPr lang="de-DE"/>
               <a:t>Dritte Ebene</a:t>
             </a:r>
           </a:p>
           <a:p>
             <a:pPr lvl="3"/>
             <a:r>
-              <a:rPr lang="de-DE" smtClean="0"/>
+              <a:rPr lang="de-DE"/>
               <a:t>Vierte Ebene</a:t>
             </a:r>
           </a:p>
           <a:p>
             <a:pPr lvl="4"/>
             <a:r>
-              <a:rPr lang="de-DE" smtClean="0"/>
+              <a:rPr lang="de-DE"/>
               <a:t>Fünfte Ebene</a:t>
             </a:r>
-            <a:endParaRPr lang="de-DE"/>
           </a:p>
         </p:txBody>
       </p:sp>
@@ -2231,7 +2229,7 @@
           <a:p>
             <a:pPr lvl="0"/>
             <a:r>
-              <a:rPr lang="de-DE" smtClean="0"/>
+              <a:rPr lang="de-DE"/>
               <a:t>Textmasterformat bearbeiten</a:t>
             </a:r>
           </a:p>
@@ -2254,7 +2252,7 @@
           <a:p>
             <a:fld id="{6CC7980B-B61E-4E35-8F3B-1A4DE9C1591D}" type="datetimeFigureOut">
               <a:rPr lang="de-DE" smtClean="0"/>
-              <a:t>23.06.2020</a:t>
+              <a:t>08.03.2021</a:t>
             </a:fld>
             <a:endParaRPr lang="de-DE"/>
           </a:p>
@@ -2357,10 +2355,9 @@
           </a:lstStyle>
           <a:p>
             <a:r>
-              <a:rPr lang="de-DE" smtClean="0"/>
+              <a:rPr lang="de-DE"/>
               <a:t>Titelmasterformat durch Klicken bearbeiten</a:t>
             </a:r>
-            <a:endParaRPr lang="de-DE"/>
           </a:p>
         </p:txBody>
       </p:sp>
@@ -2484,7 +2481,7 @@
           <a:p>
             <a:pPr lvl="0"/>
             <a:r>
-              <a:rPr lang="de-DE" smtClean="0"/>
+              <a:rPr lang="de-DE"/>
               <a:t>Textmasterformat bearbeiten</a:t>
             </a:r>
           </a:p>
@@ -2507,7 +2504,7 @@
           <a:p>
             <a:fld id="{6CC7980B-B61E-4E35-8F3B-1A4DE9C1591D}" type="datetimeFigureOut">
               <a:rPr lang="de-DE" smtClean="0"/>
-              <a:t>23.06.2020</a:t>
+              <a:t>08.03.2021</a:t>
             </a:fld>
             <a:endParaRPr lang="de-DE"/>
           </a:p>
@@ -2616,10 +2613,9 @@
           <a:lstStyle/>
           <a:p>
             <a:r>
-              <a:rPr lang="de-DE" smtClean="0"/>
+              <a:rPr lang="de-DE"/>
               <a:t>Titelmasterformat durch Klicken bearbeiten</a:t>
             </a:r>
-            <a:endParaRPr lang="de-DE"/>
           </a:p>
         </p:txBody>
       </p:sp>
@@ -2650,38 +2646,37 @@
           <a:p>
             <a:pPr lvl="0"/>
             <a:r>
-              <a:rPr lang="de-DE" smtClean="0"/>
+              <a:rPr lang="de-DE"/>
               <a:t>Textmasterformat bearbeiten</a:t>
             </a:r>
           </a:p>
           <a:p>
             <a:pPr lvl="1"/>
             <a:r>
-              <a:rPr lang="de-DE" smtClean="0"/>
+              <a:rPr lang="de-DE"/>
               <a:t>Zweite Ebene</a:t>
             </a:r>
           </a:p>
           <a:p>
             <a:pPr lvl="2"/>
             <a:r>
-              <a:rPr lang="de-DE" smtClean="0"/>
+              <a:rPr lang="de-DE"/>
               <a:t>Dritte Ebene</a:t>
             </a:r>
           </a:p>
           <a:p>
             <a:pPr lvl="3"/>
             <a:r>
-              <a:rPr lang="de-DE" smtClean="0"/>
+              <a:rPr lang="de-DE"/>
               <a:t>Vierte Ebene</a:t>
             </a:r>
           </a:p>
           <a:p>
             <a:pPr lvl="4"/>
             <a:r>
-              <a:rPr lang="de-DE" smtClean="0"/>
+              <a:rPr lang="de-DE"/>
               <a:t>Fünfte Ebene</a:t>
             </a:r>
-            <a:endParaRPr lang="de-DE"/>
           </a:p>
         </p:txBody>
       </p:sp>
@@ -2720,7 +2715,7 @@
           <a:p>
             <a:fld id="{6CC7980B-B61E-4E35-8F3B-1A4DE9C1591D}" type="datetimeFigureOut">
               <a:rPr lang="de-DE" smtClean="0"/>
-              <a:t>23.06.2020</a:t>
+              <a:t>08.03.2021</a:t>
             </a:fld>
             <a:endParaRPr lang="de-DE"/>
           </a:p>
@@ -3103,7 +3098,7 @@
         </p:nvSpPr>
         <p:spPr>
           <a:xfrm>
-            <a:off x="6828749" y="1494026"/>
+            <a:off x="6828749" y="1539864"/>
             <a:ext cx="1216762" cy="1967948"/>
           </a:xfrm>
           <a:prstGeom prst="rect">
@@ -3166,7 +3161,7 @@
         </p:nvSpPr>
         <p:spPr>
           <a:xfrm>
-            <a:off x="90066" y="1465467"/>
+            <a:off x="90066" y="1511305"/>
             <a:ext cx="1216762" cy="1967948"/>
           </a:xfrm>
           <a:prstGeom prst="rect">
@@ -3229,7 +3224,7 @@
         </p:nvSpPr>
         <p:spPr>
           <a:xfrm>
-            <a:off x="3483626" y="3444674"/>
+            <a:off x="3483626" y="3490512"/>
             <a:ext cx="1118586" cy="594804"/>
           </a:xfrm>
           <a:prstGeom prst="rect">
@@ -3270,7 +3265,7 @@
               <a:defRPr/>
             </a:pPr>
             <a:r>
-              <a:rPr kumimoji="0" lang="en-GB" sz="1800" b="0" i="0" u="none" strike="noStrike" kern="0" cap="none" spc="0" normalizeH="0" baseline="0" noProof="0" dirty="0" smtClean="0">
+              <a:rPr kumimoji="0" lang="en-GB" sz="1800" b="0" i="0" u="none" strike="noStrike" kern="0" cap="none" spc="0" normalizeH="0" baseline="0" noProof="0" dirty="0">
                 <a:ln>
                   <a:noFill/>
                 </a:ln>
@@ -3286,20 +3281,6 @@
               </a:rPr>
               <a:t>Clinic 2</a:t>
             </a:r>
-            <a:endParaRPr kumimoji="0" lang="en-GB" sz="1800" b="0" i="0" u="none" strike="noStrike" kern="0" cap="none" spc="0" normalizeH="0" baseline="0" noProof="0" dirty="0">
-              <a:ln>
-                <a:noFill/>
-              </a:ln>
-              <a:solidFill>
-                <a:srgbClr val="FFFFFF"/>
-              </a:solidFill>
-              <a:effectLst/>
-              <a:uLnTx/>
-              <a:uFillTx/>
-              <a:latin typeface="Arial"/>
-              <a:ea typeface="+mn-ea"/>
-              <a:cs typeface="+mn-cs"/>
-            </a:endParaRPr>
           </a:p>
         </p:txBody>
       </p:sp>
@@ -3311,7 +3292,7 @@
         </p:nvSpPr>
         <p:spPr>
           <a:xfrm>
-            <a:off x="3546238" y="711398"/>
+            <a:off x="3546238" y="757236"/>
             <a:ext cx="1118586" cy="594804"/>
           </a:xfrm>
           <a:prstGeom prst="rect">
@@ -3352,7 +3333,7 @@
               <a:defRPr/>
             </a:pPr>
             <a:r>
-              <a:rPr kumimoji="0" lang="en-GB" sz="1800" b="0" i="0" u="none" strike="noStrike" kern="0" cap="none" spc="0" normalizeH="0" baseline="0" noProof="0" dirty="0" smtClean="0">
+              <a:rPr kumimoji="0" lang="en-GB" sz="1800" b="0" i="0" u="none" strike="noStrike" kern="0" cap="none" spc="0" normalizeH="0" baseline="0" noProof="0" dirty="0">
                 <a:ln>
                   <a:noFill/>
                 </a:ln>
@@ -3368,20 +3349,6 @@
               </a:rPr>
               <a:t>Clinic 1</a:t>
             </a:r>
-            <a:endParaRPr kumimoji="0" lang="en-GB" sz="1800" b="0" i="0" u="none" strike="noStrike" kern="0" cap="none" spc="0" normalizeH="0" baseline="0" noProof="0" dirty="0">
-              <a:ln>
-                <a:noFill/>
-              </a:ln>
-              <a:solidFill>
-                <a:srgbClr val="FFFFFF"/>
-              </a:solidFill>
-              <a:effectLst/>
-              <a:uLnTx/>
-              <a:uFillTx/>
-              <a:latin typeface="Arial"/>
-              <a:ea typeface="+mn-ea"/>
-              <a:cs typeface="+mn-cs"/>
-            </a:endParaRPr>
           </a:p>
         </p:txBody>
       </p:sp>
@@ -3393,7 +3360,7 @@
         </p:nvCxnSpPr>
         <p:spPr>
           <a:xfrm flipH="1">
-            <a:off x="4768977" y="2761698"/>
+            <a:off x="4768977" y="2807536"/>
             <a:ext cx="1949770" cy="980378"/>
           </a:xfrm>
           <a:prstGeom prst="straightConnector1">
@@ -3422,7 +3389,7 @@
         </p:nvCxnSpPr>
         <p:spPr>
           <a:xfrm flipH="1" flipV="1">
-            <a:off x="4768976" y="1008801"/>
+            <a:off x="4768976" y="1054639"/>
             <a:ext cx="1949771" cy="1087378"/>
           </a:xfrm>
           <a:prstGeom prst="straightConnector1">
@@ -3451,7 +3418,7 @@
         </p:nvSpPr>
         <p:spPr>
           <a:xfrm>
-            <a:off x="3606051" y="1182653"/>
+            <a:off x="3606051" y="1228491"/>
             <a:ext cx="998960" cy="871036"/>
           </a:xfrm>
           <a:prstGeom prst="arc">
@@ -3520,7 +3487,7 @@
         </p:nvSpPr>
         <p:spPr>
           <a:xfrm>
-            <a:off x="5080870" y="1137364"/>
+            <a:off x="5080870" y="1183202"/>
             <a:ext cx="327931" cy="328103"/>
           </a:xfrm>
           <a:prstGeom prst="ellipse">
@@ -3584,7 +3551,7 @@
         </p:nvSpPr>
         <p:spPr>
           <a:xfrm>
-            <a:off x="5080871" y="3356387"/>
+            <a:off x="5080871" y="3402225"/>
             <a:ext cx="327931" cy="328103"/>
           </a:xfrm>
           <a:prstGeom prst="ellipse">
@@ -3648,7 +3615,7 @@
         </p:nvSpPr>
         <p:spPr>
           <a:xfrm>
-            <a:off x="3606051" y="3948713"/>
+            <a:off x="3606051" y="3994551"/>
             <a:ext cx="998960" cy="871036"/>
           </a:xfrm>
           <a:prstGeom prst="arc">
@@ -3738,7 +3705,7 @@
         </p:blipFill>
         <p:spPr>
           <a:xfrm>
-            <a:off x="5570221" y="1427213"/>
+            <a:off x="5570221" y="1473051"/>
             <a:ext cx="951716" cy="732713"/>
           </a:xfrm>
           <a:prstGeom prst="rect">
@@ -3775,7 +3742,7 @@
         </p:blipFill>
         <p:spPr>
           <a:xfrm>
-            <a:off x="5570221" y="2761698"/>
+            <a:off x="5570221" y="2807536"/>
             <a:ext cx="951716" cy="732713"/>
           </a:xfrm>
           <a:prstGeom prst="rect">
@@ -3791,7 +3758,7 @@
         </p:nvSpPr>
         <p:spPr>
           <a:xfrm>
-            <a:off x="4441045" y="1465467"/>
+            <a:off x="4441045" y="1511305"/>
             <a:ext cx="327931" cy="328103"/>
           </a:xfrm>
           <a:prstGeom prst="ellipse">
@@ -3855,7 +3822,7 @@
         </p:nvSpPr>
         <p:spPr>
           <a:xfrm>
-            <a:off x="4441045" y="4220179"/>
+            <a:off x="4441045" y="4266017"/>
             <a:ext cx="327931" cy="328103"/>
           </a:xfrm>
           <a:prstGeom prst="ellipse">
@@ -3940,7 +3907,7 @@
         </p:blipFill>
         <p:spPr>
           <a:xfrm>
-            <a:off x="6961272" y="1740280"/>
+            <a:off x="6961272" y="1786118"/>
             <a:ext cx="951716" cy="732713"/>
           </a:xfrm>
           <a:prstGeom prst="rect">
@@ -3977,7 +3944,7 @@
         </p:blipFill>
         <p:spPr>
           <a:xfrm>
-            <a:off x="6961272" y="2463457"/>
+            <a:off x="6961272" y="2509295"/>
             <a:ext cx="951716" cy="732713"/>
           </a:xfrm>
           <a:prstGeom prst="rect">
@@ -3993,7 +3960,7 @@
         </p:nvCxnSpPr>
         <p:spPr>
           <a:xfrm flipH="1">
-            <a:off x="1386210" y="1008800"/>
+            <a:off x="1386210" y="1054638"/>
             <a:ext cx="1053922" cy="1044889"/>
           </a:xfrm>
           <a:prstGeom prst="straightConnector1">
@@ -4022,7 +3989,7 @@
         </p:nvCxnSpPr>
         <p:spPr>
           <a:xfrm flipH="1" flipV="1">
-            <a:off x="1386210" y="2923524"/>
+            <a:off x="1386210" y="2969362"/>
             <a:ext cx="936104" cy="861087"/>
           </a:xfrm>
           <a:prstGeom prst="straightConnector1">
@@ -4054,7 +4021,7 @@
         </p:nvCxnSpPr>
         <p:spPr>
           <a:xfrm flipH="1">
-            <a:off x="90066" y="2449441"/>
+            <a:off x="90066" y="2495279"/>
             <a:ext cx="1216762" cy="0"/>
           </a:xfrm>
           <a:prstGeom prst="straightConnector1">
@@ -4080,7 +4047,7 @@
         </p:nvSpPr>
         <p:spPr>
           <a:xfrm>
-            <a:off x="1754853" y="1342805"/>
+            <a:off x="1754853" y="1388643"/>
             <a:ext cx="327931" cy="328103"/>
           </a:xfrm>
           <a:prstGeom prst="ellipse">
@@ -4117,7 +4084,7 @@
               <a:defRPr/>
             </a:pPr>
             <a:r>
-              <a:rPr kumimoji="0" lang="de-DE" sz="1800" b="0" i="0" u="none" strike="noStrike" kern="0" cap="none" spc="0" normalizeH="0" baseline="0" noProof="0" dirty="0" smtClean="0">
+              <a:rPr kumimoji="0" lang="de-DE" sz="1800" b="0" i="0" u="none" strike="noStrike" kern="0" cap="none" spc="0" normalizeH="0" baseline="0" noProof="0" dirty="0">
                 <a:ln>
                   <a:noFill/>
                 </a:ln>
@@ -4133,20 +4100,6 @@
               </a:rPr>
               <a:t>1</a:t>
             </a:r>
-            <a:endParaRPr kumimoji="0" lang="de-DE" sz="1800" b="0" i="0" u="none" strike="noStrike" kern="0" cap="none" spc="0" normalizeH="0" baseline="0" noProof="0" dirty="0">
-              <a:ln>
-                <a:noFill/>
-              </a:ln>
-              <a:solidFill>
-                <a:srgbClr val="FFFFFF"/>
-              </a:solidFill>
-              <a:effectLst/>
-              <a:uLnTx/>
-              <a:uFillTx/>
-              <a:latin typeface="Arial"/>
-              <a:ea typeface="+mn-ea"/>
-              <a:cs typeface="+mn-cs"/>
-            </a:endParaRPr>
           </a:p>
         </p:txBody>
       </p:sp>
@@ -4158,7 +4111,7 @@
         </p:nvSpPr>
         <p:spPr>
           <a:xfrm>
-            <a:off x="1754853" y="3262909"/>
+            <a:off x="1754853" y="3308747"/>
             <a:ext cx="327931" cy="328103"/>
           </a:xfrm>
           <a:prstGeom prst="ellipse">
@@ -4195,7 +4148,7 @@
               <a:defRPr/>
             </a:pPr>
             <a:r>
-              <a:rPr kumimoji="0" lang="de-DE" sz="1800" b="0" i="0" u="none" strike="noStrike" kern="0" cap="none" spc="0" normalizeH="0" baseline="0" noProof="0" dirty="0" smtClean="0">
+              <a:rPr kumimoji="0" lang="de-DE" sz="1800" b="0" i="0" u="none" strike="noStrike" kern="0" cap="none" spc="0" normalizeH="0" baseline="0" noProof="0" dirty="0">
                 <a:ln>
                   <a:noFill/>
                 </a:ln>
@@ -4211,20 +4164,6 @@
               </a:rPr>
               <a:t>1</a:t>
             </a:r>
-            <a:endParaRPr kumimoji="0" lang="de-DE" sz="1800" b="0" i="0" u="none" strike="noStrike" kern="0" cap="none" spc="0" normalizeH="0" baseline="0" noProof="0" dirty="0">
-              <a:ln>
-                <a:noFill/>
-              </a:ln>
-              <a:solidFill>
-                <a:srgbClr val="FFFFFF"/>
-              </a:solidFill>
-              <a:effectLst/>
-              <a:uLnTx/>
-              <a:uFillTx/>
-              <a:latin typeface="Arial"/>
-              <a:ea typeface="+mn-ea"/>
-              <a:cs typeface="+mn-cs"/>
-            </a:endParaRPr>
           </a:p>
         </p:txBody>
       </p:sp>
@@ -4239,7 +4178,7 @@
         </p:nvCxnSpPr>
         <p:spPr>
           <a:xfrm rot="16200000" flipH="1">
-            <a:off x="4053508" y="-1889595"/>
+            <a:off x="4053508" y="-1843757"/>
             <a:ext cx="28559" cy="6738683"/>
           </a:xfrm>
           <a:prstGeom prst="curvedConnector3">
@@ -4248,9 +4187,12 @@
             </a:avLst>
           </a:prstGeom>
           <a:noFill/>
-          <a:ln w="19050" cap="flat" cmpd="sng" algn="ctr">
+          <a:ln w="22225" cap="flat" cmpd="tri" algn="ctr">
             <a:solidFill>
-              <a:srgbClr val="BE0028"/>
+              <a:srgbClr val="C8C8C8">
+                <a:shade val="95000"/>
+                <a:satMod val="105000"/>
+              </a:srgbClr>
             </a:solidFill>
             <a:prstDash val="solid"/>
             <a:headEnd type="arrow"/>
@@ -4281,7 +4223,7 @@
         </p:blipFill>
         <p:spPr>
           <a:xfrm>
-            <a:off x="2440131" y="3399876"/>
+            <a:off x="2440131" y="3445714"/>
             <a:ext cx="962303" cy="740233"/>
           </a:xfrm>
           <a:prstGeom prst="rect">
@@ -4311,7 +4253,7 @@
         </p:blipFill>
         <p:spPr>
           <a:xfrm>
-            <a:off x="2512139" y="638684"/>
+            <a:off x="2512139" y="684522"/>
             <a:ext cx="962303" cy="740233"/>
           </a:xfrm>
           <a:prstGeom prst="rect">
@@ -4341,7 +4283,7 @@
         </p:blipFill>
         <p:spPr>
           <a:xfrm>
-            <a:off x="223220" y="1733251"/>
+            <a:off x="223220" y="1779089"/>
             <a:ext cx="962303" cy="740233"/>
           </a:xfrm>
           <a:prstGeom prst="rect">
@@ -4371,7 +4313,7 @@
         </p:blipFill>
         <p:spPr>
           <a:xfrm>
-            <a:off x="224121" y="2448572"/>
+            <a:off x="224121" y="2494410"/>
             <a:ext cx="962303" cy="740233"/>
           </a:xfrm>
           <a:prstGeom prst="rect">
@@ -4408,7 +4350,7 @@
         </p:blipFill>
         <p:spPr>
           <a:xfrm>
-            <a:off x="3856024" y="1707727"/>
+            <a:off x="3856024" y="1753565"/>
             <a:ext cx="585021" cy="691924"/>
           </a:xfrm>
           <a:prstGeom prst="rect">
@@ -4445,7 +4387,7 @@
         </p:blipFill>
         <p:spPr>
           <a:xfrm>
-            <a:off x="3856024" y="4384231"/>
+            <a:off x="3856024" y="4430069"/>
             <a:ext cx="585021" cy="691924"/>
           </a:xfrm>
           <a:prstGeom prst="rect">
@@ -4453,6 +4395,76 @@
           </a:prstGeom>
         </p:spPr>
       </p:pic>
+      <p:sp>
+        <p:nvSpPr>
+          <p:cNvPr id="30" name="Ellipse 29">
+            <a:extLst>
+              <a:ext uri="{FF2B5EF4-FFF2-40B4-BE49-F238E27FC236}">
+                <a16:creationId xmlns:a16="http://schemas.microsoft.com/office/drawing/2014/main" id="{95C5905B-8193-4F15-81AB-FE6EA10D4CF8}"/>
+              </a:ext>
+            </a:extLst>
+          </p:cNvPr>
+          <p:cNvSpPr/>
+          <p:nvPr/>
+        </p:nvSpPr>
+        <p:spPr>
+          <a:xfrm>
+            <a:off x="3903821" y="-7340"/>
+            <a:ext cx="327931" cy="328103"/>
+          </a:xfrm>
+          <a:prstGeom prst="ellipse">
+            <a:avLst/>
+          </a:prstGeom>
+          <a:solidFill>
+            <a:srgbClr val="C8C8C8"/>
+          </a:solidFill>
+          <a:ln w="25400" cap="flat" cmpd="sng" algn="ctr">
+            <a:noFill/>
+            <a:prstDash val="solid"/>
+          </a:ln>
+          <a:effectLst/>
+        </p:spPr>
+        <p:txBody>
+          <a:bodyPr rtlCol="0" anchor="ctr"/>
+          <a:lstStyle/>
+          <a:p>
+            <a:pPr marL="0" marR="0" lvl="0" indent="0" algn="ctr" defTabSz="914400" eaLnBrk="1" fontAlgn="auto" latinLnBrk="0" hangingPunct="1">
+              <a:lnSpc>
+                <a:spcPct val="100000"/>
+              </a:lnSpc>
+              <a:spcBef>
+                <a:spcPts val="0"/>
+              </a:spcBef>
+              <a:spcAft>
+                <a:spcPts val="0"/>
+              </a:spcAft>
+              <a:buClrTx/>
+              <a:buSzTx/>
+              <a:buFontTx/>
+              <a:buNone/>
+              <a:tabLst/>
+              <a:defRPr/>
+            </a:pPr>
+            <a:r>
+              <a:rPr kumimoji="0" lang="de-DE" sz="1800" b="0" i="0" u="none" strike="noStrike" kern="0" cap="none" spc="0" normalizeH="0" baseline="0" noProof="0" dirty="0">
+                <a:ln>
+                  <a:noFill/>
+                </a:ln>
+                <a:solidFill>
+                  <a:srgbClr val="FFFFFF"/>
+                </a:solidFill>
+                <a:effectLst/>
+                <a:uLnTx/>
+                <a:uFillTx/>
+                <a:latin typeface="Arial"/>
+                <a:ea typeface="+mn-ea"/>
+                <a:cs typeface="+mn-cs"/>
+              </a:rPr>
+              <a:t>4</a:t>
+            </a:r>
+          </a:p>
+        </p:txBody>
+      </p:sp>
     </p:spTree>
     <p:extLst>
       <p:ext uri="{BB962C8B-B14F-4D97-AF65-F5344CB8AC3E}">
@@ -4463,13 +4475,6 @@
   <p:clrMapOvr>
     <a:masterClrMapping/>
   </p:clrMapOvr>
-  <p:timing>
-    <p:tnLst>
-      <p:par>
-        <p:cTn id="1" dur="indefinite" restart="never" nodeType="tmRoot"/>
-      </p:par>
-    </p:tnLst>
-  </p:timing>
 </p:sld>
 </file>
 

</xml_diff>